<commit_message>
Removing boat from figure
</commit_message>
<xml_diff>
--- a/extras/FiguresOhdsiCommunity.pptx
+++ b/extras/FiguresOhdsiCommunity.pptx
@@ -312,7 +312,7 @@
           <a:noFill/>
           <a:extLst>
             <a:ext uri="{909E8E84-426E-40dd-AFC4-6F175D3DCCD1}">
-              <a14:hiddenFill xmlns:a14="http://schemas.microsoft.com/office/drawing/2010/main" xmlns="">
+              <a14:hiddenFill xmlns="" xmlns:a14="http://schemas.microsoft.com/office/drawing/2010/main">
                 <a:solidFill>
                   <a:srgbClr val="FFFFFF"/>
                 </a:solidFill>
@@ -830,7 +830,7 @@
           <a:noFill/>
           <a:extLst>
             <a:ext uri="{909E8E84-426E-40dd-AFC4-6F175D3DCCD1}">
-              <a14:hiddenFill xmlns:a14="http://schemas.microsoft.com/office/drawing/2010/main" xmlns="">
+              <a14:hiddenFill xmlns="" xmlns:a14="http://schemas.microsoft.com/office/drawing/2010/main">
                 <a:solidFill>
                   <a:srgbClr val="FFFFFF"/>
                 </a:solidFill>
@@ -1322,7 +1322,7 @@
           <a:noFill/>
           <a:extLst>
             <a:ext uri="{909E8E84-426E-40dd-AFC4-6F175D3DCCD1}">
-              <a14:hiddenFill xmlns:a14="http://schemas.microsoft.com/office/drawing/2010/main" xmlns="">
+              <a14:hiddenFill xmlns="" xmlns:a14="http://schemas.microsoft.com/office/drawing/2010/main">
                 <a:solidFill>
                   <a:srgbClr val="FFFFFF"/>
                 </a:solidFill>
@@ -1512,7 +1512,7 @@
           <a:noFill/>
           <a:extLst>
             <a:ext uri="{909E8E84-426E-40dd-AFC4-6F175D3DCCD1}">
-              <a14:hiddenFill xmlns:a14="http://schemas.microsoft.com/office/drawing/2010/main" xmlns="">
+              <a14:hiddenFill xmlns="" xmlns:a14="http://schemas.microsoft.com/office/drawing/2010/main">
                 <a:solidFill>
                   <a:srgbClr val="FFFFFF"/>
                 </a:solidFill>
@@ -1680,7 +1680,7 @@
           <a:noFill/>
           <a:extLst>
             <a:ext uri="{909E8E84-426E-40dd-AFC4-6F175D3DCCD1}">
-              <a14:hiddenFill xmlns:a14="http://schemas.microsoft.com/office/drawing/2010/main" xmlns="">
+              <a14:hiddenFill xmlns="" xmlns:a14="http://schemas.microsoft.com/office/drawing/2010/main">
                 <a:solidFill>
                   <a:srgbClr val="FFFFFF"/>
                 </a:solidFill>
@@ -3509,42 +3509,6 @@
           </a:p>
         </p:txBody>
       </p:sp>
-      <p:pic>
-        <p:nvPicPr>
-          <p:cNvPr id="27" name="Picture 26">
-            <a:extLst>
-              <a:ext uri="{FF2B5EF4-FFF2-40B4-BE49-F238E27FC236}">
-                <a16:creationId xmlns:a16="http://schemas.microsoft.com/office/drawing/2014/main" id="{085DE3FA-64FA-4BB2-8717-DAA84C9B5F16}"/>
-              </a:ext>
-            </a:extLst>
-          </p:cNvPr>
-          <p:cNvPicPr>
-            <a:picLocks noChangeAspect="1"/>
-          </p:cNvPicPr>
-          <p:nvPr/>
-        </p:nvPicPr>
-        <p:blipFill>
-          <a:blip r:embed="rId2">
-            <a:extLst>
-              <a:ext uri="{28A0092B-C50C-407E-A947-70E740481C1C}">
-                <a14:useLocalDpi xmlns:a14="http://schemas.microsoft.com/office/drawing/2010/main" val="0"/>
-              </a:ext>
-            </a:extLst>
-          </a:blip>
-          <a:stretch>
-            <a:fillRect/>
-          </a:stretch>
-        </p:blipFill>
-        <p:spPr>
-          <a:xfrm rot="1204212">
-            <a:off x="2210135" y="3038307"/>
-            <a:ext cx="993653" cy="781387"/>
-          </a:xfrm>
-          <a:prstGeom prst="rect">
-            <a:avLst/>
-          </a:prstGeom>
-        </p:spPr>
-      </p:pic>
     </p:spTree>
     <p:extLst>
       <p:ext uri="{BB962C8B-B14F-4D97-AF65-F5344CB8AC3E}">

</xml_diff>